<commit_message>
Completed the lesson 3
</commit_message>
<xml_diff>
--- a/Step 3/Inventors ClubV1 - Step 3.pptx
+++ b/Step 3/Inventors ClubV1 - Step 3.pptx
@@ -5,10 +5,10 @@
     <p:sldMasterId id="2147483648" r:id="rId1"/>
   </p:sldMasterIdLst>
   <p:notesMasterIdLst>
-    <p:notesMasterId r:id="rId10"/>
+    <p:notesMasterId r:id="rId11"/>
   </p:notesMasterIdLst>
   <p:handoutMasterIdLst>
-    <p:handoutMasterId r:id="rId11"/>
+    <p:handoutMasterId r:id="rId12"/>
   </p:handoutMasterIdLst>
   <p:sldIdLst>
     <p:sldId id="256" r:id="rId2"/>
@@ -18,7 +18,8 @@
     <p:sldId id="289" r:id="rId6"/>
     <p:sldId id="290" r:id="rId7"/>
     <p:sldId id="291" r:id="rId8"/>
-    <p:sldId id="287" r:id="rId9"/>
+    <p:sldId id="292" r:id="rId9"/>
+    <p:sldId id="287" r:id="rId10"/>
   </p:sldIdLst>
   <p:sldSz cx="9144000" cy="6858000" type="screen4x3"/>
   <p:notesSz cx="6819900" cy="9918700"/>
@@ -3647,11 +3648,7 @@
             </a:br>
             <a:r>
               <a:rPr lang="en-GB" sz="1600" dirty="0" smtClean="0"/>
-              <a:t>Step </a:t>
-            </a:r>
-            <a:r>
-              <a:rPr lang="en-GB" sz="1600" dirty="0" smtClean="0"/>
-              <a:t>3</a:t>
+              <a:t>Step 3</a:t>
             </a:r>
             <a:endParaRPr lang="en-GB" sz="1600" dirty="0"/>
           </a:p>
@@ -3682,7 +3679,6 @@
               <a:rPr lang="en-GB" dirty="0" smtClean="0"/>
               <a:t>Getting Computers to &lt;say&gt; things</a:t>
             </a:r>
-            <a:endParaRPr lang="en-GB" dirty="0" smtClean="0"/>
           </a:p>
           <a:p>
             <a:endParaRPr lang="en-GB" dirty="0"/>
@@ -3970,15 +3966,7 @@
             </a:pPr>
             <a:r>
               <a:rPr lang="en-GB" sz="3000" dirty="0" smtClean="0"/>
-              <a:t>Launched </a:t>
-            </a:r>
-            <a:r>
-              <a:rPr lang="en-GB" sz="3000" dirty="0" smtClean="0"/>
-              <a:t>our </a:t>
-            </a:r>
-            <a:r>
-              <a:rPr lang="en-GB" sz="3000" dirty="0" smtClean="0"/>
-              <a:t>server and put some code on it: 54.76.117.119</a:t>
+              <a:t>Launched our server and put some code on it: 54.76.117.119</a:t>
             </a:r>
           </a:p>
           <a:p>
@@ -4106,7 +4094,6 @@
               <a:rPr lang="en-GB" sz="3000" dirty="0" smtClean="0"/>
               <a:t>what does it mean?</a:t>
             </a:r>
-            <a:endParaRPr lang="en-GB" sz="3000" dirty="0" smtClean="0"/>
           </a:p>
         </p:txBody>
       </p:sp>
@@ -4381,7 +4368,6 @@
               <a:rPr lang="en-GB" sz="3000" dirty="0" smtClean="0"/>
               <a:t>?&gt;</a:t>
             </a:r>
-            <a:endParaRPr lang="en-GB" sz="3000" dirty="0" smtClean="0"/>
           </a:p>
         </p:txBody>
       </p:sp>
@@ -6389,8 +6375,13 @@
             </a:pPr>
             <a:r>
               <a:rPr lang="en-GB" sz="3000" dirty="0" smtClean="0"/>
-              <a:t>Visit http://www.dhsapplab.co/t1</a:t>
-            </a:r>
+              <a:t>Visit http://</a:t>
+            </a:r>
+            <a:r>
+              <a:rPr lang="en-GB" sz="3000" dirty="0" smtClean="0"/>
+              <a:t>www.dhsapplab.co/t1.php</a:t>
+            </a:r>
+            <a:endParaRPr lang="en-GB" sz="3000" dirty="0" smtClean="0"/>
           </a:p>
           <a:p>
             <a:pPr marL="285750" lvl="1" indent="-285750">
@@ -6417,11 +6408,7 @@
             </a:pPr>
             <a:r>
               <a:rPr lang="en-GB" sz="3000" dirty="0" smtClean="0"/>
-              <a:t>What did </a:t>
-            </a:r>
-            <a:r>
-              <a:rPr lang="en-GB" sz="3000" smtClean="0"/>
-              <a:t>you hear?</a:t>
+              <a:t>What did you hear?</a:t>
             </a:r>
             <a:endParaRPr lang="en-GB" sz="3000" dirty="0"/>
           </a:p>
@@ -6469,6 +6456,404 @@
 </file>
 
 <file path=ppt/slides/slide8.xml><?xml version="1.0" encoding="utf-8"?>
+<p:sld xmlns:a="http://schemas.openxmlformats.org/drawingml/2006/main" xmlns:r="http://schemas.openxmlformats.org/officeDocument/2006/relationships" xmlns:p="http://schemas.openxmlformats.org/presentationml/2006/main">
+  <p:cSld>
+    <p:spTree>
+      <p:nvGrpSpPr>
+        <p:cNvPr id="1" name=""/>
+        <p:cNvGrpSpPr/>
+        <p:nvPr/>
+      </p:nvGrpSpPr>
+      <p:grpSpPr>
+        <a:xfrm>
+          <a:off x="0" y="0"/>
+          <a:ext cx="0" cy="0"/>
+          <a:chOff x="0" y="0"/>
+          <a:chExt cx="0" cy="0"/>
+        </a:xfrm>
+      </p:grpSpPr>
+      <p:sp>
+        <p:nvSpPr>
+          <p:cNvPr id="2" name="Title 1"/>
+          <p:cNvSpPr>
+            <a:spLocks noGrp="1"/>
+          </p:cNvSpPr>
+          <p:nvPr>
+            <p:ph type="ctrTitle"/>
+          </p:nvPr>
+        </p:nvSpPr>
+        <p:spPr>
+          <a:xfrm>
+            <a:off x="251520" y="332656"/>
+            <a:ext cx="8384251" cy="792088"/>
+          </a:xfrm>
+        </p:spPr>
+        <p:txBody>
+          <a:bodyPr>
+            <a:noAutofit/>
+          </a:bodyPr>
+          <a:lstStyle/>
+          <a:p>
+            <a:pPr algn="l"/>
+            <a:r>
+              <a:rPr lang="en-GB" sz="4000" smtClean="0"/>
+              <a:t>Lets Code t2.php</a:t>
+            </a:r>
+            <a:endParaRPr lang="en-GB" sz="4000" dirty="0"/>
+          </a:p>
+        </p:txBody>
+      </p:sp>
+      <p:pic>
+        <p:nvPicPr>
+          <p:cNvPr id="1026" name="Picture 2" descr="Devonshire House School"/>
+          <p:cNvPicPr>
+            <a:picLocks noChangeAspect="1" noChangeArrowheads="1"/>
+          </p:cNvPicPr>
+          <p:nvPr/>
+        </p:nvPicPr>
+        <p:blipFill>
+          <a:blip r:embed="rId2" cstate="screen">
+            <a:extLst>
+              <a:ext uri="{28A0092B-C50C-407E-A947-70E740481C1C}">
+                <a14:useLocalDpi xmlns:a14="http://schemas.microsoft.com/office/drawing/2010/main"/>
+              </a:ext>
+            </a:extLst>
+          </a:blip>
+          <a:srcRect/>
+          <a:stretch>
+            <a:fillRect/>
+          </a:stretch>
+        </p:blipFill>
+        <p:spPr bwMode="auto">
+          <a:xfrm>
+            <a:off x="7020272" y="6453335"/>
+            <a:ext cx="1615499" cy="288000"/>
+          </a:xfrm>
+          <a:prstGeom prst="rect">
+            <a:avLst/>
+          </a:prstGeom>
+          <a:noFill/>
+          <a:extLst>
+            <a:ext uri="{909E8E84-426E-40DD-AFC4-6F175D3DCCD1}">
+              <a14:hiddenFill xmlns:a14="http://schemas.microsoft.com/office/drawing/2010/main">
+                <a:solidFill>
+                  <a:srgbClr val="FFFFFF"/>
+                </a:solidFill>
+              </a14:hiddenFill>
+            </a:ext>
+          </a:extLst>
+        </p:spPr>
+      </p:pic>
+      <p:pic>
+        <p:nvPicPr>
+          <p:cNvPr id="1028" name="Picture 4" descr="http://impulse.com/wp-content/uploads/2011/12/apple-orange.png"/>
+          <p:cNvPicPr>
+            <a:picLocks noChangeAspect="1" noChangeArrowheads="1"/>
+          </p:cNvPicPr>
+          <p:nvPr/>
+        </p:nvPicPr>
+        <p:blipFill>
+          <a:blip r:embed="rId3" cstate="screen">
+            <a:extLst>
+              <a:ext uri="{28A0092B-C50C-407E-A947-70E740481C1C}">
+                <a14:useLocalDpi xmlns:a14="http://schemas.microsoft.com/office/drawing/2010/main"/>
+              </a:ext>
+            </a:extLst>
+          </a:blip>
+          <a:srcRect/>
+          <a:stretch>
+            <a:fillRect/>
+          </a:stretch>
+        </p:blipFill>
+        <p:spPr bwMode="auto">
+          <a:xfrm>
+            <a:off x="8652550" y="6453336"/>
+            <a:ext cx="354294" cy="288000"/>
+          </a:xfrm>
+          <a:prstGeom prst="rect">
+            <a:avLst/>
+          </a:prstGeom>
+          <a:noFill/>
+          <a:extLst>
+            <a:ext uri="{909E8E84-426E-40DD-AFC4-6F175D3DCCD1}">
+              <a14:hiddenFill xmlns:a14="http://schemas.microsoft.com/office/drawing/2010/main">
+                <a:solidFill>
+                  <a:srgbClr val="FFFFFF"/>
+                </a:solidFill>
+              </a14:hiddenFill>
+            </a:ext>
+          </a:extLst>
+        </p:spPr>
+      </p:pic>
+      <p:sp>
+        <p:nvSpPr>
+          <p:cNvPr id="3" name="TextBox 2"/>
+          <p:cNvSpPr txBox="1"/>
+          <p:nvPr/>
+        </p:nvSpPr>
+        <p:spPr>
+          <a:xfrm>
+            <a:off x="251520" y="980728"/>
+            <a:ext cx="9217024" cy="5693866"/>
+          </a:xfrm>
+          <a:prstGeom prst="rect">
+            <a:avLst/>
+          </a:prstGeom>
+          <a:noFill/>
+        </p:spPr>
+        <p:txBody>
+          <a:bodyPr wrap="square" rtlCol="0">
+            <a:spAutoFit/>
+          </a:bodyPr>
+          <a:lstStyle/>
+          <a:p>
+            <a:pPr marL="0" lvl="1"/>
+            <a:r>
+              <a:rPr lang="en-GB" sz="1400" dirty="0"/>
+              <a:t>&lt;?</a:t>
+            </a:r>
+            <a:r>
+              <a:rPr lang="en-GB" sz="1400" dirty="0" err="1"/>
+              <a:t>php</a:t>
+            </a:r>
+            <a:endParaRPr lang="en-GB" sz="1400" dirty="0"/>
+          </a:p>
+          <a:p>
+            <a:pPr marL="0" lvl="1"/>
+            <a:endParaRPr lang="en-GB" sz="1400" dirty="0"/>
+          </a:p>
+          <a:p>
+            <a:pPr marL="0" lvl="1"/>
+            <a:r>
+              <a:rPr lang="en-GB" sz="1400" dirty="0"/>
+              <a:t># A welcome greeting</a:t>
+            </a:r>
+          </a:p>
+          <a:p>
+            <a:pPr marL="0" lvl="1"/>
+            <a:r>
+              <a:rPr lang="en-GB" sz="1400" dirty="0"/>
+              <a:t>$greeting="Welcome to </a:t>
+            </a:r>
+            <a:r>
+              <a:rPr lang="en-GB" sz="1400" dirty="0" err="1"/>
+              <a:t>devonshire</a:t>
+            </a:r>
+            <a:r>
+              <a:rPr lang="en-GB" sz="1400" dirty="0"/>
+              <a:t> house app lab";</a:t>
+            </a:r>
+          </a:p>
+          <a:p>
+            <a:pPr marL="0" lvl="1"/>
+            <a:endParaRPr lang="en-GB" sz="1400" dirty="0"/>
+          </a:p>
+          <a:p>
+            <a:pPr marL="0" lvl="1"/>
+            <a:r>
+              <a:rPr lang="en-GB" sz="1400" dirty="0"/>
+              <a:t># A bit of text</a:t>
+            </a:r>
+          </a:p>
+          <a:p>
+            <a:pPr marL="0" lvl="1"/>
+            <a:r>
+              <a:rPr lang="en-GB" sz="1400" dirty="0"/>
+              <a:t>$message="The time now is";</a:t>
+            </a:r>
+          </a:p>
+          <a:p>
+            <a:pPr marL="0" lvl="1"/>
+            <a:endParaRPr lang="en-GB" sz="1400" dirty="0"/>
+          </a:p>
+          <a:p>
+            <a:pPr marL="0" lvl="1"/>
+            <a:r>
+              <a:rPr lang="en-GB" sz="1400" dirty="0"/>
+              <a:t># Get the time</a:t>
+            </a:r>
+          </a:p>
+          <a:p>
+            <a:pPr marL="0" lvl="1"/>
+            <a:r>
+              <a:rPr lang="en-GB" sz="1400" dirty="0"/>
+              <a:t>$time = time();</a:t>
+            </a:r>
+          </a:p>
+          <a:p>
+            <a:pPr marL="0" lvl="1"/>
+            <a:r>
+              <a:rPr lang="en-GB" sz="1400" dirty="0"/>
+              <a:t># Convert the time into something understandable</a:t>
+            </a:r>
+          </a:p>
+          <a:p>
+            <a:pPr marL="0" lvl="1"/>
+            <a:r>
+              <a:rPr lang="en-GB" sz="1400" dirty="0"/>
+              <a:t>$</a:t>
+            </a:r>
+            <a:r>
+              <a:rPr lang="en-GB" sz="1400" dirty="0" err="1"/>
+              <a:t>formatted_time</a:t>
+            </a:r>
+            <a:r>
+              <a:rPr lang="en-GB" sz="1400" dirty="0"/>
+              <a:t> = </a:t>
+            </a:r>
+            <a:r>
+              <a:rPr lang="en-GB" sz="1400" dirty="0" err="1"/>
+              <a:t>gmdate</a:t>
+            </a:r>
+            <a:r>
+              <a:rPr lang="en-GB" sz="1400" dirty="0"/>
+              <a:t>("</a:t>
+            </a:r>
+            <a:r>
+              <a:rPr lang="en-GB" sz="1400" dirty="0" err="1"/>
+              <a:t>H:i:s</a:t>
+            </a:r>
+            <a:r>
+              <a:rPr lang="en-GB" sz="1400" dirty="0"/>
+              <a:t>",$time);</a:t>
+            </a:r>
+          </a:p>
+          <a:p>
+            <a:pPr marL="0" lvl="1"/>
+            <a:endParaRPr lang="en-GB" sz="1400" dirty="0"/>
+          </a:p>
+          <a:p>
+            <a:pPr marL="0" lvl="1"/>
+            <a:r>
+              <a:rPr lang="en-GB" sz="1400" dirty="0"/>
+              <a:t>#</a:t>
+            </a:r>
+            <a:r>
+              <a:rPr lang="en-GB" sz="1400" dirty="0" err="1"/>
+              <a:t>Goodby</a:t>
+            </a:r>
+            <a:r>
+              <a:rPr lang="en-GB" sz="1400" dirty="0"/>
+              <a:t> message</a:t>
+            </a:r>
+          </a:p>
+          <a:p>
+            <a:pPr marL="0" lvl="1"/>
+            <a:r>
+              <a:rPr lang="en-GB" sz="1400" dirty="0"/>
+              <a:t>$goodbye="This app was build by Adrian";</a:t>
+            </a:r>
+          </a:p>
+          <a:p>
+            <a:pPr marL="0" lvl="1"/>
+            <a:r>
+              <a:rPr lang="en-GB" sz="1400" dirty="0"/>
+              <a:t>#Lets add our names</a:t>
+            </a:r>
+          </a:p>
+          <a:p>
+            <a:pPr marL="0" lvl="1"/>
+            <a:endParaRPr lang="en-GB" sz="1400" dirty="0"/>
+          </a:p>
+          <a:p>
+            <a:pPr marL="0" lvl="1"/>
+            <a:r>
+              <a:rPr lang="en-GB" sz="1400" dirty="0"/>
+              <a:t>header('Content-type: text/xml');</a:t>
+            </a:r>
+          </a:p>
+          <a:p>
+            <a:pPr marL="0" lvl="1"/>
+            <a:r>
+              <a:rPr lang="en-GB" sz="1400" dirty="0"/>
+              <a:t>echo "&lt;?xml version='1.0' encoding='UTF-8'?&gt;";</a:t>
+            </a:r>
+          </a:p>
+          <a:p>
+            <a:pPr marL="0" lvl="1"/>
+            <a:r>
+              <a:rPr lang="en-GB" sz="1400" dirty="0"/>
+              <a:t>	echo "&lt;Response&gt;";</a:t>
+            </a:r>
+          </a:p>
+          <a:p>
+            <a:pPr marL="0" lvl="1"/>
+            <a:r>
+              <a:rPr lang="en-GB" sz="1400" dirty="0"/>
+              <a:t> 		echo "&lt;Say&gt;$greeting&lt;/Say&gt;";</a:t>
+            </a:r>
+          </a:p>
+          <a:p>
+            <a:pPr marL="0" lvl="1"/>
+            <a:r>
+              <a:rPr lang="en-GB" sz="1400" dirty="0"/>
+              <a:t> 		echo "&lt;Say&gt;$message&lt;/Say&gt;";</a:t>
+            </a:r>
+          </a:p>
+          <a:p>
+            <a:pPr marL="0" lvl="1"/>
+            <a:r>
+              <a:rPr lang="en-GB" sz="1400" dirty="0"/>
+              <a:t> 		echo "&lt;Say&gt;$</a:t>
+            </a:r>
+            <a:r>
+              <a:rPr lang="en-GB" sz="1400" dirty="0" err="1"/>
+              <a:t>formatted_time</a:t>
+            </a:r>
+            <a:r>
+              <a:rPr lang="en-GB" sz="1400" dirty="0"/>
+              <a:t>&lt;/Say&gt;";</a:t>
+            </a:r>
+          </a:p>
+          <a:p>
+            <a:pPr marL="0" lvl="1"/>
+            <a:r>
+              <a:rPr lang="en-GB" sz="1400" dirty="0"/>
+              <a:t> 		echo "&lt;Say&gt;$goodbye&lt;/Say&gt;";</a:t>
+            </a:r>
+          </a:p>
+          <a:p>
+            <a:pPr marL="0" lvl="1"/>
+            <a:r>
+              <a:rPr lang="en-GB" sz="1400" dirty="0"/>
+              <a:t>	echo "&lt;/Response</a:t>
+            </a:r>
+            <a:r>
+              <a:rPr lang="en-GB" sz="1400" dirty="0" smtClean="0"/>
+              <a:t>&gt;";</a:t>
+            </a:r>
+          </a:p>
+          <a:p>
+            <a:pPr marL="0" lvl="1"/>
+            <a:r>
+              <a:rPr lang="en-GB" sz="1400" dirty="0" smtClean="0"/>
+              <a:t>?&gt;</a:t>
+            </a:r>
+            <a:endParaRPr lang="en-GB" sz="1400" dirty="0" smtClean="0"/>
+          </a:p>
+        </p:txBody>
+      </p:sp>
+    </p:spTree>
+    <p:extLst>
+      <p:ext uri="{BB962C8B-B14F-4D97-AF65-F5344CB8AC3E}">
+        <p14:creationId xmlns:p14="http://schemas.microsoft.com/office/powerpoint/2010/main" val="1216935547"/>
+      </p:ext>
+    </p:extLst>
+  </p:cSld>
+  <p:clrMapOvr>
+    <a:masterClrMapping/>
+  </p:clrMapOvr>
+  <p:timing>
+    <p:tnLst>
+      <p:par>
+        <p:cTn id="1" dur="indefinite" restart="never" nodeType="tmRoot"/>
+      </p:par>
+    </p:tnLst>
+  </p:timing>
+</p:sld>
+</file>
+
+<file path=ppt/slides/slide9.xml><?xml version="1.0" encoding="utf-8"?>
 <p:sld xmlns:a="http://schemas.openxmlformats.org/drawingml/2006/main" xmlns:r="http://schemas.openxmlformats.org/officeDocument/2006/relationships" xmlns:p="http://schemas.openxmlformats.org/presentationml/2006/main">
   <p:cSld>
     <p:spTree>

</xml_diff>

<commit_message>
Put animations into ppt
</commit_message>
<xml_diff>
--- a/Step 3/Inventors ClubV1 - Step 3.pptx
+++ b/Step 3/Inventors ClubV1 - Step 3.pptx
@@ -203,7 +203,7 @@
           <a:p>
             <a:fld id="{8EFF4239-B5F8-4087-84C9-1B43CF659C27}" type="datetimeFigureOut">
               <a:rPr lang="en-GB" smtClean="0"/>
-              <a:t>29/06/2014</a:t>
+              <a:t>30/06/2014</a:t>
             </a:fld>
             <a:endParaRPr lang="en-GB"/>
           </a:p>
@@ -368,7 +368,7 @@
           <a:p>
             <a:fld id="{EA188F31-6C86-469F-B95E-FC0351CD4411}" type="datetimeFigureOut">
               <a:rPr lang="en-GB" smtClean="0"/>
-              <a:t>29/06/2014</a:t>
+              <a:t>30/06/2014</a:t>
             </a:fld>
             <a:endParaRPr lang="en-GB"/>
           </a:p>
@@ -817,7 +817,7 @@
           <a:p>
             <a:fld id="{886050C4-653A-43C6-AD39-6836BA98FC5A}" type="datetimeFigureOut">
               <a:rPr lang="en-GB" smtClean="0"/>
-              <a:t>29/06/2014</a:t>
+              <a:t>30/06/2014</a:t>
             </a:fld>
             <a:endParaRPr lang="en-GB"/>
           </a:p>
@@ -987,7 +987,7 @@
           <a:p>
             <a:fld id="{886050C4-653A-43C6-AD39-6836BA98FC5A}" type="datetimeFigureOut">
               <a:rPr lang="en-GB" smtClean="0"/>
-              <a:t>29/06/2014</a:t>
+              <a:t>30/06/2014</a:t>
             </a:fld>
             <a:endParaRPr lang="en-GB"/>
           </a:p>
@@ -1167,7 +1167,7 @@
           <a:p>
             <a:fld id="{886050C4-653A-43C6-AD39-6836BA98FC5A}" type="datetimeFigureOut">
               <a:rPr lang="en-GB" smtClean="0"/>
-              <a:t>29/06/2014</a:t>
+              <a:t>30/06/2014</a:t>
             </a:fld>
             <a:endParaRPr lang="en-GB"/>
           </a:p>
@@ -1337,7 +1337,7 @@
           <a:p>
             <a:fld id="{886050C4-653A-43C6-AD39-6836BA98FC5A}" type="datetimeFigureOut">
               <a:rPr lang="en-GB" smtClean="0"/>
-              <a:t>29/06/2014</a:t>
+              <a:t>30/06/2014</a:t>
             </a:fld>
             <a:endParaRPr lang="en-GB"/>
           </a:p>
@@ -1583,7 +1583,7 @@
           <a:p>
             <a:fld id="{886050C4-653A-43C6-AD39-6836BA98FC5A}" type="datetimeFigureOut">
               <a:rPr lang="en-GB" smtClean="0"/>
-              <a:t>29/06/2014</a:t>
+              <a:t>30/06/2014</a:t>
             </a:fld>
             <a:endParaRPr lang="en-GB"/>
           </a:p>
@@ -1871,7 +1871,7 @@
           <a:p>
             <a:fld id="{886050C4-653A-43C6-AD39-6836BA98FC5A}" type="datetimeFigureOut">
               <a:rPr lang="en-GB" smtClean="0"/>
-              <a:t>29/06/2014</a:t>
+              <a:t>30/06/2014</a:t>
             </a:fld>
             <a:endParaRPr lang="en-GB"/>
           </a:p>
@@ -2293,7 +2293,7 @@
           <a:p>
             <a:fld id="{886050C4-653A-43C6-AD39-6836BA98FC5A}" type="datetimeFigureOut">
               <a:rPr lang="en-GB" smtClean="0"/>
-              <a:t>29/06/2014</a:t>
+              <a:t>30/06/2014</a:t>
             </a:fld>
             <a:endParaRPr lang="en-GB"/>
           </a:p>
@@ -2411,7 +2411,7 @@
           <a:p>
             <a:fld id="{886050C4-653A-43C6-AD39-6836BA98FC5A}" type="datetimeFigureOut">
               <a:rPr lang="en-GB" smtClean="0"/>
-              <a:t>29/06/2014</a:t>
+              <a:t>30/06/2014</a:t>
             </a:fld>
             <a:endParaRPr lang="en-GB"/>
           </a:p>
@@ -2506,7 +2506,7 @@
           <a:p>
             <a:fld id="{886050C4-653A-43C6-AD39-6836BA98FC5A}" type="datetimeFigureOut">
               <a:rPr lang="en-GB" smtClean="0"/>
-              <a:t>29/06/2014</a:t>
+              <a:t>30/06/2014</a:t>
             </a:fld>
             <a:endParaRPr lang="en-GB"/>
           </a:p>
@@ -2783,7 +2783,7 @@
           <a:p>
             <a:fld id="{886050C4-653A-43C6-AD39-6836BA98FC5A}" type="datetimeFigureOut">
               <a:rPr lang="en-GB" smtClean="0"/>
-              <a:t>29/06/2014</a:t>
+              <a:t>30/06/2014</a:t>
             </a:fld>
             <a:endParaRPr lang="en-GB"/>
           </a:p>
@@ -3036,7 +3036,7 @@
           <a:p>
             <a:fld id="{886050C4-653A-43C6-AD39-6836BA98FC5A}" type="datetimeFigureOut">
               <a:rPr lang="en-GB" smtClean="0"/>
-              <a:t>29/06/2014</a:t>
+              <a:t>30/06/2014</a:t>
             </a:fld>
             <a:endParaRPr lang="en-GB"/>
           </a:p>
@@ -3249,7 +3249,7 @@
           <a:p>
             <a:fld id="{886050C4-653A-43C6-AD39-6836BA98FC5A}" type="datetimeFigureOut">
               <a:rPr lang="en-GB" smtClean="0"/>
-              <a:t>29/06/2014</a:t>
+              <a:t>30/06/2014</a:t>
             </a:fld>
             <a:endParaRPr lang="en-GB"/>
           </a:p>
@@ -4110,7 +4110,421 @@
   <p:timing>
     <p:tnLst>
       <p:par>
-        <p:cTn id="1" dur="indefinite" restart="never" nodeType="tmRoot"/>
+        <p:cTn id="1" dur="indefinite" restart="never" nodeType="tmRoot">
+          <p:childTnLst>
+            <p:seq concurrent="1" nextAc="seek">
+              <p:cTn id="2" dur="indefinite" nodeType="mainSeq">
+                <p:childTnLst>
+                  <p:par>
+                    <p:cTn id="3" fill="hold">
+                      <p:stCondLst>
+                        <p:cond delay="indefinite"/>
+                      </p:stCondLst>
+                      <p:childTnLst>
+                        <p:par>
+                          <p:cTn id="4" fill="hold">
+                            <p:stCondLst>
+                              <p:cond delay="0"/>
+                            </p:stCondLst>
+                            <p:childTnLst>
+                              <p:par>
+                                <p:cTn id="5" presetID="10" presetClass="entr" presetSubtype="0" fill="hold" nodeType="clickEffect">
+                                  <p:stCondLst>
+                                    <p:cond delay="0"/>
+                                  </p:stCondLst>
+                                  <p:childTnLst>
+                                    <p:set>
+                                      <p:cBhvr>
+                                        <p:cTn id="6" dur="1" fill="hold">
+                                          <p:stCondLst>
+                                            <p:cond delay="0"/>
+                                          </p:stCondLst>
+                                        </p:cTn>
+                                        <p:tgtEl>
+                                          <p:spTgt spid="5">
+                                            <p:txEl>
+                                              <p:pRg st="1" end="1"/>
+                                            </p:txEl>
+                                          </p:spTgt>
+                                        </p:tgtEl>
+                                        <p:attrNameLst>
+                                          <p:attrName>style.visibility</p:attrName>
+                                        </p:attrNameLst>
+                                      </p:cBhvr>
+                                      <p:to>
+                                        <p:strVal val="visible"/>
+                                      </p:to>
+                                    </p:set>
+                                    <p:animEffect transition="in" filter="fade">
+                                      <p:cBhvr>
+                                        <p:cTn id="7" dur="500"/>
+                                        <p:tgtEl>
+                                          <p:spTgt spid="5">
+                                            <p:txEl>
+                                              <p:pRg st="1" end="1"/>
+                                            </p:txEl>
+                                          </p:spTgt>
+                                        </p:tgtEl>
+                                      </p:cBhvr>
+                                    </p:animEffect>
+                                  </p:childTnLst>
+                                </p:cTn>
+                              </p:par>
+                            </p:childTnLst>
+                          </p:cTn>
+                        </p:par>
+                      </p:childTnLst>
+                    </p:cTn>
+                  </p:par>
+                  <p:par>
+                    <p:cTn id="8" fill="hold">
+                      <p:stCondLst>
+                        <p:cond delay="indefinite"/>
+                      </p:stCondLst>
+                      <p:childTnLst>
+                        <p:par>
+                          <p:cTn id="9" fill="hold">
+                            <p:stCondLst>
+                              <p:cond delay="0"/>
+                            </p:stCondLst>
+                            <p:childTnLst>
+                              <p:par>
+                                <p:cTn id="10" presetID="10" presetClass="entr" presetSubtype="0" fill="hold" nodeType="clickEffect">
+                                  <p:stCondLst>
+                                    <p:cond delay="0"/>
+                                  </p:stCondLst>
+                                  <p:childTnLst>
+                                    <p:set>
+                                      <p:cBhvr>
+                                        <p:cTn id="11" dur="1" fill="hold">
+                                          <p:stCondLst>
+                                            <p:cond delay="0"/>
+                                          </p:stCondLst>
+                                        </p:cTn>
+                                        <p:tgtEl>
+                                          <p:spTgt spid="5">
+                                            <p:txEl>
+                                              <p:pRg st="2" end="2"/>
+                                            </p:txEl>
+                                          </p:spTgt>
+                                        </p:tgtEl>
+                                        <p:attrNameLst>
+                                          <p:attrName>style.visibility</p:attrName>
+                                        </p:attrNameLst>
+                                      </p:cBhvr>
+                                      <p:to>
+                                        <p:strVal val="visible"/>
+                                      </p:to>
+                                    </p:set>
+                                    <p:animEffect transition="in" filter="fade">
+                                      <p:cBhvr>
+                                        <p:cTn id="12" dur="500"/>
+                                        <p:tgtEl>
+                                          <p:spTgt spid="5">
+                                            <p:txEl>
+                                              <p:pRg st="2" end="2"/>
+                                            </p:txEl>
+                                          </p:spTgt>
+                                        </p:tgtEl>
+                                      </p:cBhvr>
+                                    </p:animEffect>
+                                  </p:childTnLst>
+                                </p:cTn>
+                              </p:par>
+                            </p:childTnLst>
+                          </p:cTn>
+                        </p:par>
+                      </p:childTnLst>
+                    </p:cTn>
+                  </p:par>
+                  <p:par>
+                    <p:cTn id="13" fill="hold">
+                      <p:stCondLst>
+                        <p:cond delay="indefinite"/>
+                      </p:stCondLst>
+                      <p:childTnLst>
+                        <p:par>
+                          <p:cTn id="14" fill="hold">
+                            <p:stCondLst>
+                              <p:cond delay="0"/>
+                            </p:stCondLst>
+                            <p:childTnLst>
+                              <p:par>
+                                <p:cTn id="15" presetID="10" presetClass="entr" presetSubtype="0" fill="hold" nodeType="clickEffect">
+                                  <p:stCondLst>
+                                    <p:cond delay="0"/>
+                                  </p:stCondLst>
+                                  <p:childTnLst>
+                                    <p:set>
+                                      <p:cBhvr>
+                                        <p:cTn id="16" dur="1" fill="hold">
+                                          <p:stCondLst>
+                                            <p:cond delay="0"/>
+                                          </p:stCondLst>
+                                        </p:cTn>
+                                        <p:tgtEl>
+                                          <p:spTgt spid="5">
+                                            <p:txEl>
+                                              <p:pRg st="3" end="3"/>
+                                            </p:txEl>
+                                          </p:spTgt>
+                                        </p:tgtEl>
+                                        <p:attrNameLst>
+                                          <p:attrName>style.visibility</p:attrName>
+                                        </p:attrNameLst>
+                                      </p:cBhvr>
+                                      <p:to>
+                                        <p:strVal val="visible"/>
+                                      </p:to>
+                                    </p:set>
+                                    <p:animEffect transition="in" filter="fade">
+                                      <p:cBhvr>
+                                        <p:cTn id="17" dur="500"/>
+                                        <p:tgtEl>
+                                          <p:spTgt spid="5">
+                                            <p:txEl>
+                                              <p:pRg st="3" end="3"/>
+                                            </p:txEl>
+                                          </p:spTgt>
+                                        </p:tgtEl>
+                                      </p:cBhvr>
+                                    </p:animEffect>
+                                  </p:childTnLst>
+                                </p:cTn>
+                              </p:par>
+                            </p:childTnLst>
+                          </p:cTn>
+                        </p:par>
+                      </p:childTnLst>
+                    </p:cTn>
+                  </p:par>
+                  <p:par>
+                    <p:cTn id="18" fill="hold">
+                      <p:stCondLst>
+                        <p:cond delay="indefinite"/>
+                      </p:stCondLst>
+                      <p:childTnLst>
+                        <p:par>
+                          <p:cTn id="19" fill="hold">
+                            <p:stCondLst>
+                              <p:cond delay="0"/>
+                            </p:stCondLst>
+                            <p:childTnLst>
+                              <p:par>
+                                <p:cTn id="20" presetID="10" presetClass="entr" presetSubtype="0" fill="hold" nodeType="clickEffect">
+                                  <p:stCondLst>
+                                    <p:cond delay="0"/>
+                                  </p:stCondLst>
+                                  <p:childTnLst>
+                                    <p:set>
+                                      <p:cBhvr>
+                                        <p:cTn id="21" dur="1" fill="hold">
+                                          <p:stCondLst>
+                                            <p:cond delay="0"/>
+                                          </p:stCondLst>
+                                        </p:cTn>
+                                        <p:tgtEl>
+                                          <p:spTgt spid="5">
+                                            <p:txEl>
+                                              <p:pRg st="4" end="4"/>
+                                            </p:txEl>
+                                          </p:spTgt>
+                                        </p:tgtEl>
+                                        <p:attrNameLst>
+                                          <p:attrName>style.visibility</p:attrName>
+                                        </p:attrNameLst>
+                                      </p:cBhvr>
+                                      <p:to>
+                                        <p:strVal val="visible"/>
+                                      </p:to>
+                                    </p:set>
+                                    <p:animEffect transition="in" filter="fade">
+                                      <p:cBhvr>
+                                        <p:cTn id="22" dur="500"/>
+                                        <p:tgtEl>
+                                          <p:spTgt spid="5">
+                                            <p:txEl>
+                                              <p:pRg st="4" end="4"/>
+                                            </p:txEl>
+                                          </p:spTgt>
+                                        </p:tgtEl>
+                                      </p:cBhvr>
+                                    </p:animEffect>
+                                  </p:childTnLst>
+                                </p:cTn>
+                              </p:par>
+                            </p:childTnLst>
+                          </p:cTn>
+                        </p:par>
+                      </p:childTnLst>
+                    </p:cTn>
+                  </p:par>
+                  <p:par>
+                    <p:cTn id="23" fill="hold">
+                      <p:stCondLst>
+                        <p:cond delay="indefinite"/>
+                      </p:stCondLst>
+                      <p:childTnLst>
+                        <p:par>
+                          <p:cTn id="24" fill="hold">
+                            <p:stCondLst>
+                              <p:cond delay="0"/>
+                            </p:stCondLst>
+                            <p:childTnLst>
+                              <p:par>
+                                <p:cTn id="25" presetID="10" presetClass="entr" presetSubtype="0" fill="hold" nodeType="clickEffect">
+                                  <p:stCondLst>
+                                    <p:cond delay="0"/>
+                                  </p:stCondLst>
+                                  <p:childTnLst>
+                                    <p:set>
+                                      <p:cBhvr>
+                                        <p:cTn id="26" dur="1" fill="hold">
+                                          <p:stCondLst>
+                                            <p:cond delay="0"/>
+                                          </p:stCondLst>
+                                        </p:cTn>
+                                        <p:tgtEl>
+                                          <p:spTgt spid="5">
+                                            <p:txEl>
+                                              <p:pRg st="5" end="5"/>
+                                            </p:txEl>
+                                          </p:spTgt>
+                                        </p:tgtEl>
+                                        <p:attrNameLst>
+                                          <p:attrName>style.visibility</p:attrName>
+                                        </p:attrNameLst>
+                                      </p:cBhvr>
+                                      <p:to>
+                                        <p:strVal val="visible"/>
+                                      </p:to>
+                                    </p:set>
+                                    <p:animEffect transition="in" filter="fade">
+                                      <p:cBhvr>
+                                        <p:cTn id="27" dur="500"/>
+                                        <p:tgtEl>
+                                          <p:spTgt spid="5">
+                                            <p:txEl>
+                                              <p:pRg st="5" end="5"/>
+                                            </p:txEl>
+                                          </p:spTgt>
+                                        </p:tgtEl>
+                                      </p:cBhvr>
+                                    </p:animEffect>
+                                  </p:childTnLst>
+                                </p:cTn>
+                              </p:par>
+                              <p:par>
+                                <p:cTn id="28" presetID="10" presetClass="entr" presetSubtype="0" fill="hold" nodeType="withEffect">
+                                  <p:stCondLst>
+                                    <p:cond delay="0"/>
+                                  </p:stCondLst>
+                                  <p:childTnLst>
+                                    <p:set>
+                                      <p:cBhvr>
+                                        <p:cTn id="29" dur="1" fill="hold">
+                                          <p:stCondLst>
+                                            <p:cond delay="0"/>
+                                          </p:stCondLst>
+                                        </p:cTn>
+                                        <p:tgtEl>
+                                          <p:spTgt spid="5">
+                                            <p:txEl>
+                                              <p:pRg st="6" end="6"/>
+                                            </p:txEl>
+                                          </p:spTgt>
+                                        </p:tgtEl>
+                                        <p:attrNameLst>
+                                          <p:attrName>style.visibility</p:attrName>
+                                        </p:attrNameLst>
+                                      </p:cBhvr>
+                                      <p:to>
+                                        <p:strVal val="visible"/>
+                                      </p:to>
+                                    </p:set>
+                                    <p:animEffect transition="in" filter="fade">
+                                      <p:cBhvr>
+                                        <p:cTn id="30" dur="500"/>
+                                        <p:tgtEl>
+                                          <p:spTgt spid="5">
+                                            <p:txEl>
+                                              <p:pRg st="6" end="6"/>
+                                            </p:txEl>
+                                          </p:spTgt>
+                                        </p:tgtEl>
+                                      </p:cBhvr>
+                                    </p:animEffect>
+                                  </p:childTnLst>
+                                </p:cTn>
+                              </p:par>
+                              <p:par>
+                                <p:cTn id="31" presetID="10" presetClass="entr" presetSubtype="0" fill="hold" nodeType="withEffect">
+                                  <p:stCondLst>
+                                    <p:cond delay="0"/>
+                                  </p:stCondLst>
+                                  <p:childTnLst>
+                                    <p:set>
+                                      <p:cBhvr>
+                                        <p:cTn id="32" dur="1" fill="hold">
+                                          <p:stCondLst>
+                                            <p:cond delay="0"/>
+                                          </p:stCondLst>
+                                        </p:cTn>
+                                        <p:tgtEl>
+                                          <p:spTgt spid="5">
+                                            <p:txEl>
+                                              <p:pRg st="7" end="7"/>
+                                            </p:txEl>
+                                          </p:spTgt>
+                                        </p:tgtEl>
+                                        <p:attrNameLst>
+                                          <p:attrName>style.visibility</p:attrName>
+                                        </p:attrNameLst>
+                                      </p:cBhvr>
+                                      <p:to>
+                                        <p:strVal val="visible"/>
+                                      </p:to>
+                                    </p:set>
+                                    <p:animEffect transition="in" filter="fade">
+                                      <p:cBhvr>
+                                        <p:cTn id="33" dur="500"/>
+                                        <p:tgtEl>
+                                          <p:spTgt spid="5">
+                                            <p:txEl>
+                                              <p:pRg st="7" end="7"/>
+                                            </p:txEl>
+                                          </p:spTgt>
+                                        </p:tgtEl>
+                                      </p:cBhvr>
+                                    </p:animEffect>
+                                  </p:childTnLst>
+                                </p:cTn>
+                              </p:par>
+                            </p:childTnLst>
+                          </p:cTn>
+                        </p:par>
+                      </p:childTnLst>
+                    </p:cTn>
+                  </p:par>
+                </p:childTnLst>
+              </p:cTn>
+              <p:prevCondLst>
+                <p:cond evt="onPrev" delay="0">
+                  <p:tgtEl>
+                    <p:sldTgt/>
+                  </p:tgtEl>
+                </p:cond>
+              </p:prevCondLst>
+              <p:nextCondLst>
+                <p:cond evt="onNext" delay="0">
+                  <p:tgtEl>
+                    <p:sldTgt/>
+                  </p:tgtEl>
+                </p:cond>
+              </p:nextCondLst>
+            </p:seq>
+          </p:childTnLst>
+        </p:cTn>
       </p:par>
     </p:tnLst>
   </p:timing>
@@ -6165,7 +6579,7 @@
         </p:nvSpPr>
         <p:spPr>
           <a:xfrm>
-            <a:off x="7455436" y="3888924"/>
+            <a:off x="7020272" y="3888924"/>
             <a:ext cx="3237244" cy="369332"/>
           </a:xfrm>
           <a:prstGeom prst="rect">
@@ -6375,13 +6789,8 @@
             </a:pPr>
             <a:r>
               <a:rPr lang="en-GB" sz="3000" dirty="0" smtClean="0"/>
-              <a:t>Visit http://</a:t>
-            </a:r>
-            <a:r>
-              <a:rPr lang="en-GB" sz="3000" dirty="0" smtClean="0"/>
-              <a:t>www.dhsapplab.co/t1.php</a:t>
-            </a:r>
-            <a:endParaRPr lang="en-GB" sz="3000" dirty="0" smtClean="0"/>
+              <a:t>Visit http://www.dhsapplab.co/t1.php</a:t>
+            </a:r>
           </a:p>
           <a:p>
             <a:pPr marL="285750" lvl="1" indent="-285750">
@@ -6829,7 +7238,6 @@
               <a:rPr lang="en-GB" sz="1400" dirty="0" smtClean="0"/>
               <a:t>?&gt;</a:t>
             </a:r>
-            <a:endParaRPr lang="en-GB" sz="1400" dirty="0" smtClean="0"/>
           </a:p>
         </p:txBody>
       </p:sp>

</xml_diff>